<commit_message>
Updated the hardware images.
</commit_message>
<xml_diff>
--- a/hardware/Holder.pptx
+++ b/hardware/Holder.pptx
@@ -6,8 +6,10 @@
   </p:sldMasterIdLst>
   <p:sldIdLst>
     <p:sldId id="256" r:id="rId2"/>
-    <p:sldId id="258" r:id="rId3"/>
-    <p:sldId id="257" r:id="rId4"/>
+    <p:sldId id="260" r:id="rId3"/>
+    <p:sldId id="258" r:id="rId4"/>
+    <p:sldId id="259" r:id="rId5"/>
+    <p:sldId id="257" r:id="rId6"/>
   </p:sldIdLst>
   <p:sldSz cx="6858000" cy="9906000" type="A4"/>
   <p:notesSz cx="6858000" cy="9144000"/>
@@ -245,7 +247,7 @@
           <a:p>
             <a:fld id="{F82F713A-5EB9-4B7A-B87D-F2B7940161AF}" type="datetimeFigureOut">
               <a:rPr lang="en-NZ" smtClean="0"/>
-              <a:t>3/02/2019</a:t>
+              <a:t>7/02/2019</a:t>
             </a:fld>
             <a:endParaRPr lang="en-NZ"/>
           </a:p>
@@ -415,7 +417,7 @@
           <a:p>
             <a:fld id="{F82F713A-5EB9-4B7A-B87D-F2B7940161AF}" type="datetimeFigureOut">
               <a:rPr lang="en-NZ" smtClean="0"/>
-              <a:t>3/02/2019</a:t>
+              <a:t>7/02/2019</a:t>
             </a:fld>
             <a:endParaRPr lang="en-NZ"/>
           </a:p>
@@ -595,7 +597,7 @@
           <a:p>
             <a:fld id="{F82F713A-5EB9-4B7A-B87D-F2B7940161AF}" type="datetimeFigureOut">
               <a:rPr lang="en-NZ" smtClean="0"/>
-              <a:t>3/02/2019</a:t>
+              <a:t>7/02/2019</a:t>
             </a:fld>
             <a:endParaRPr lang="en-NZ"/>
           </a:p>
@@ -765,7 +767,7 @@
           <a:p>
             <a:fld id="{F82F713A-5EB9-4B7A-B87D-F2B7940161AF}" type="datetimeFigureOut">
               <a:rPr lang="en-NZ" smtClean="0"/>
-              <a:t>3/02/2019</a:t>
+              <a:t>7/02/2019</a:t>
             </a:fld>
             <a:endParaRPr lang="en-NZ"/>
           </a:p>
@@ -1011,7 +1013,7 @@
           <a:p>
             <a:fld id="{F82F713A-5EB9-4B7A-B87D-F2B7940161AF}" type="datetimeFigureOut">
               <a:rPr lang="en-NZ" smtClean="0"/>
-              <a:t>3/02/2019</a:t>
+              <a:t>7/02/2019</a:t>
             </a:fld>
             <a:endParaRPr lang="en-NZ"/>
           </a:p>
@@ -1243,7 +1245,7 @@
           <a:p>
             <a:fld id="{F82F713A-5EB9-4B7A-B87D-F2B7940161AF}" type="datetimeFigureOut">
               <a:rPr lang="en-NZ" smtClean="0"/>
-              <a:t>3/02/2019</a:t>
+              <a:t>7/02/2019</a:t>
             </a:fld>
             <a:endParaRPr lang="en-NZ"/>
           </a:p>
@@ -1610,7 +1612,7 @@
           <a:p>
             <a:fld id="{F82F713A-5EB9-4B7A-B87D-F2B7940161AF}" type="datetimeFigureOut">
               <a:rPr lang="en-NZ" smtClean="0"/>
-              <a:t>3/02/2019</a:t>
+              <a:t>7/02/2019</a:t>
             </a:fld>
             <a:endParaRPr lang="en-NZ"/>
           </a:p>
@@ -1728,7 +1730,7 @@
           <a:p>
             <a:fld id="{F82F713A-5EB9-4B7A-B87D-F2B7940161AF}" type="datetimeFigureOut">
               <a:rPr lang="en-NZ" smtClean="0"/>
-              <a:t>3/02/2019</a:t>
+              <a:t>7/02/2019</a:t>
             </a:fld>
             <a:endParaRPr lang="en-NZ"/>
           </a:p>
@@ -1823,7 +1825,7 @@
           <a:p>
             <a:fld id="{F82F713A-5EB9-4B7A-B87D-F2B7940161AF}" type="datetimeFigureOut">
               <a:rPr lang="en-NZ" smtClean="0"/>
-              <a:t>3/02/2019</a:t>
+              <a:t>7/02/2019</a:t>
             </a:fld>
             <a:endParaRPr lang="en-NZ"/>
           </a:p>
@@ -2100,7 +2102,7 @@
           <a:p>
             <a:fld id="{F82F713A-5EB9-4B7A-B87D-F2B7940161AF}" type="datetimeFigureOut">
               <a:rPr lang="en-NZ" smtClean="0"/>
-              <a:t>3/02/2019</a:t>
+              <a:t>7/02/2019</a:t>
             </a:fld>
             <a:endParaRPr lang="en-NZ"/>
           </a:p>
@@ -2357,7 +2359,7 @@
           <a:p>
             <a:fld id="{F82F713A-5EB9-4B7A-B87D-F2B7940161AF}" type="datetimeFigureOut">
               <a:rPr lang="en-NZ" smtClean="0"/>
-              <a:t>3/02/2019</a:t>
+              <a:t>7/02/2019</a:t>
             </a:fld>
             <a:endParaRPr lang="en-NZ"/>
           </a:p>
@@ -2570,7 +2572,7 @@
           <a:p>
             <a:fld id="{F82F713A-5EB9-4B7A-B87D-F2B7940161AF}" type="datetimeFigureOut">
               <a:rPr lang="en-NZ" smtClean="0"/>
-              <a:t>3/02/2019</a:t>
+              <a:t>7/02/2019</a:t>
             </a:fld>
             <a:endParaRPr lang="en-NZ"/>
           </a:p>
@@ -4180,6 +4182,944 @@
         </p:nvSpPr>
         <p:spPr>
           <a:xfrm>
+            <a:off x="172602" y="785539"/>
+            <a:ext cx="5040000" cy="8204544"/>
+          </a:xfrm>
+          <a:prstGeom prst="rect">
+            <a:avLst/>
+          </a:prstGeom>
+          <a:solidFill>
+            <a:schemeClr val="bg1"/>
+          </a:solidFill>
+          <a:ln>
+            <a:solidFill>
+              <a:srgbClr val="FF0000"/>
+            </a:solidFill>
+          </a:ln>
+        </p:spPr>
+        <p:style>
+          <a:lnRef idx="2">
+            <a:schemeClr val="accent1">
+              <a:shade val="50000"/>
+            </a:schemeClr>
+          </a:lnRef>
+          <a:fillRef idx="1">
+            <a:schemeClr val="accent1"/>
+          </a:fillRef>
+          <a:effectRef idx="0">
+            <a:schemeClr val="accent1"/>
+          </a:effectRef>
+          <a:fontRef idx="minor">
+            <a:schemeClr val="lt1"/>
+          </a:fontRef>
+        </p:style>
+        <p:txBody>
+          <a:bodyPr rtlCol="0" anchor="ctr"/>
+          <a:lstStyle/>
+          <a:p>
+            <a:pPr algn="ctr"/>
+            <a:endParaRPr lang="en-NZ">
+              <a:latin typeface="Juice ITC" panose="04040403040A02020202" pitchFamily="82" charset="0"/>
+            </a:endParaRPr>
+          </a:p>
+        </p:txBody>
+      </p:sp>
+      <p:sp>
+        <p:nvSpPr>
+          <p:cNvPr id="20" name="Rectangle 19"/>
+          <p:cNvSpPr/>
+          <p:nvPr/>
+        </p:nvSpPr>
+        <p:spPr>
+          <a:xfrm rot="5400000">
+            <a:off x="1978973" y="1631539"/>
+            <a:ext cx="1098000" cy="126000"/>
+          </a:xfrm>
+          <a:prstGeom prst="rect">
+            <a:avLst/>
+          </a:prstGeom>
+          <a:solidFill>
+            <a:schemeClr val="bg1"/>
+          </a:solidFill>
+          <a:ln w="3175">
+            <a:solidFill>
+              <a:srgbClr val="FF0000"/>
+            </a:solidFill>
+          </a:ln>
+        </p:spPr>
+        <p:style>
+          <a:lnRef idx="2">
+            <a:schemeClr val="accent1">
+              <a:shade val="50000"/>
+            </a:schemeClr>
+          </a:lnRef>
+          <a:fillRef idx="1">
+            <a:schemeClr val="accent1"/>
+          </a:fillRef>
+          <a:effectRef idx="0">
+            <a:schemeClr val="accent1"/>
+          </a:effectRef>
+          <a:fontRef idx="minor">
+            <a:schemeClr val="lt1"/>
+          </a:fontRef>
+        </p:style>
+        <p:txBody>
+          <a:bodyPr rtlCol="0" anchor="ctr"/>
+          <a:lstStyle/>
+          <a:p>
+            <a:pPr algn="ctr"/>
+            <a:endParaRPr lang="en-NZ"/>
+          </a:p>
+        </p:txBody>
+      </p:sp>
+      <p:sp>
+        <p:nvSpPr>
+          <p:cNvPr id="21" name="Rectangle 20"/>
+          <p:cNvSpPr/>
+          <p:nvPr/>
+        </p:nvSpPr>
+        <p:spPr>
+          <a:xfrm rot="5400000">
+            <a:off x="1978973" y="7988671"/>
+            <a:ext cx="1098000" cy="126000"/>
+          </a:xfrm>
+          <a:prstGeom prst="rect">
+            <a:avLst/>
+          </a:prstGeom>
+          <a:solidFill>
+            <a:schemeClr val="bg1"/>
+          </a:solidFill>
+          <a:ln w="3175">
+            <a:solidFill>
+              <a:srgbClr val="FF0000"/>
+            </a:solidFill>
+          </a:ln>
+        </p:spPr>
+        <p:style>
+          <a:lnRef idx="2">
+            <a:schemeClr val="accent1">
+              <a:shade val="50000"/>
+            </a:schemeClr>
+          </a:lnRef>
+          <a:fillRef idx="1">
+            <a:schemeClr val="accent1"/>
+          </a:fillRef>
+          <a:effectRef idx="0">
+            <a:schemeClr val="accent1"/>
+          </a:effectRef>
+          <a:fontRef idx="minor">
+            <a:schemeClr val="lt1"/>
+          </a:fontRef>
+        </p:style>
+        <p:txBody>
+          <a:bodyPr rtlCol="0" anchor="ctr"/>
+          <a:lstStyle/>
+          <a:p>
+            <a:pPr algn="ctr"/>
+            <a:endParaRPr lang="en-NZ"/>
+          </a:p>
+        </p:txBody>
+      </p:sp>
+      <p:sp>
+        <p:nvSpPr>
+          <p:cNvPr id="22" name="Rectangle 21"/>
+          <p:cNvSpPr/>
+          <p:nvPr/>
+        </p:nvSpPr>
+        <p:spPr>
+          <a:xfrm rot="10800000">
+            <a:off x="3277600" y="3569996"/>
+            <a:ext cx="1098000" cy="126000"/>
+          </a:xfrm>
+          <a:prstGeom prst="rect">
+            <a:avLst/>
+          </a:prstGeom>
+          <a:solidFill>
+            <a:schemeClr val="bg1"/>
+          </a:solidFill>
+          <a:ln w="3175">
+            <a:solidFill>
+              <a:srgbClr val="FF0000"/>
+            </a:solidFill>
+          </a:ln>
+        </p:spPr>
+        <p:style>
+          <a:lnRef idx="2">
+            <a:schemeClr val="accent1">
+              <a:shade val="50000"/>
+            </a:schemeClr>
+          </a:lnRef>
+          <a:fillRef idx="1">
+            <a:schemeClr val="accent1"/>
+          </a:fillRef>
+          <a:effectRef idx="0">
+            <a:schemeClr val="accent1"/>
+          </a:effectRef>
+          <a:fontRef idx="minor">
+            <a:schemeClr val="lt1"/>
+          </a:fontRef>
+        </p:style>
+        <p:txBody>
+          <a:bodyPr rtlCol="0" anchor="ctr"/>
+          <a:lstStyle/>
+          <a:p>
+            <a:pPr algn="ctr"/>
+            <a:endParaRPr lang="en-NZ"/>
+          </a:p>
+        </p:txBody>
+      </p:sp>
+      <p:sp>
+        <p:nvSpPr>
+          <p:cNvPr id="24" name="Rectangle 23"/>
+          <p:cNvSpPr/>
+          <p:nvPr/>
+        </p:nvSpPr>
+        <p:spPr>
+          <a:xfrm rot="10800000">
+            <a:off x="3277600" y="6988688"/>
+            <a:ext cx="1098000" cy="126000"/>
+          </a:xfrm>
+          <a:prstGeom prst="rect">
+            <a:avLst/>
+          </a:prstGeom>
+          <a:solidFill>
+            <a:schemeClr val="bg1"/>
+          </a:solidFill>
+          <a:ln w="3175">
+            <a:solidFill>
+              <a:srgbClr val="FF0000"/>
+            </a:solidFill>
+          </a:ln>
+        </p:spPr>
+        <p:style>
+          <a:lnRef idx="2">
+            <a:schemeClr val="accent1">
+              <a:shade val="50000"/>
+            </a:schemeClr>
+          </a:lnRef>
+          <a:fillRef idx="1">
+            <a:schemeClr val="accent1"/>
+          </a:fillRef>
+          <a:effectRef idx="0">
+            <a:schemeClr val="accent1"/>
+          </a:effectRef>
+          <a:fontRef idx="minor">
+            <a:schemeClr val="lt1"/>
+          </a:fontRef>
+        </p:style>
+        <p:txBody>
+          <a:bodyPr rtlCol="0" anchor="ctr"/>
+          <a:lstStyle/>
+          <a:p>
+            <a:pPr algn="ctr"/>
+            <a:endParaRPr lang="en-NZ"/>
+          </a:p>
+        </p:txBody>
+      </p:sp>
+      <p:sp>
+        <p:nvSpPr>
+          <p:cNvPr id="25" name="Rectangle 24"/>
+          <p:cNvSpPr/>
+          <p:nvPr/>
+        </p:nvSpPr>
+        <p:spPr>
+          <a:xfrm rot="10800000">
+            <a:off x="698426" y="6268267"/>
+            <a:ext cx="1098000" cy="126000"/>
+          </a:xfrm>
+          <a:prstGeom prst="rect">
+            <a:avLst/>
+          </a:prstGeom>
+          <a:solidFill>
+            <a:schemeClr val="bg1"/>
+          </a:solidFill>
+          <a:ln w="3175">
+            <a:solidFill>
+              <a:srgbClr val="FF0000"/>
+            </a:solidFill>
+          </a:ln>
+        </p:spPr>
+        <p:style>
+          <a:lnRef idx="2">
+            <a:schemeClr val="accent1">
+              <a:shade val="50000"/>
+            </a:schemeClr>
+          </a:lnRef>
+          <a:fillRef idx="1">
+            <a:schemeClr val="accent1"/>
+          </a:fillRef>
+          <a:effectRef idx="0">
+            <a:schemeClr val="accent1"/>
+          </a:effectRef>
+          <a:fontRef idx="minor">
+            <a:schemeClr val="lt1"/>
+          </a:fontRef>
+        </p:style>
+        <p:txBody>
+          <a:bodyPr rtlCol="0" anchor="ctr"/>
+          <a:lstStyle/>
+          <a:p>
+            <a:pPr algn="ctr"/>
+            <a:endParaRPr lang="en-NZ"/>
+          </a:p>
+        </p:txBody>
+      </p:sp>
+      <p:sp>
+        <p:nvSpPr>
+          <p:cNvPr id="26" name="Rectangle 25"/>
+          <p:cNvSpPr/>
+          <p:nvPr/>
+        </p:nvSpPr>
+        <p:spPr>
+          <a:xfrm rot="10800000">
+            <a:off x="698426" y="3391725"/>
+            <a:ext cx="1098000" cy="126000"/>
+          </a:xfrm>
+          <a:prstGeom prst="rect">
+            <a:avLst/>
+          </a:prstGeom>
+          <a:solidFill>
+            <a:schemeClr val="bg1"/>
+          </a:solidFill>
+          <a:ln w="3175">
+            <a:solidFill>
+              <a:srgbClr val="FF0000"/>
+            </a:solidFill>
+          </a:ln>
+        </p:spPr>
+        <p:style>
+          <a:lnRef idx="2">
+            <a:schemeClr val="accent1">
+              <a:shade val="50000"/>
+            </a:schemeClr>
+          </a:lnRef>
+          <a:fillRef idx="1">
+            <a:schemeClr val="accent1"/>
+          </a:fillRef>
+          <a:effectRef idx="0">
+            <a:schemeClr val="accent1"/>
+          </a:effectRef>
+          <a:fontRef idx="minor">
+            <a:schemeClr val="lt1"/>
+          </a:fontRef>
+        </p:style>
+        <p:txBody>
+          <a:bodyPr rtlCol="0" anchor="ctr"/>
+          <a:lstStyle/>
+          <a:p>
+            <a:pPr algn="ctr"/>
+            <a:endParaRPr lang="en-NZ"/>
+          </a:p>
+        </p:txBody>
+      </p:sp>
+      <p:sp>
+        <p:nvSpPr>
+          <p:cNvPr id="28" name="Freeform 27"/>
+          <p:cNvSpPr/>
+          <p:nvPr/>
+        </p:nvSpPr>
+        <p:spPr>
+          <a:xfrm>
+            <a:off x="5212602" y="794603"/>
+            <a:ext cx="1440000" cy="1548000"/>
+          </a:xfrm>
+          <a:custGeom>
+            <a:avLst/>
+            <a:gdLst>
+              <a:gd name="connsiteX0" fmla="*/ 180000 w 1440000"/>
+              <a:gd name="connsiteY0" fmla="*/ 0 h 1548000"/>
+              <a:gd name="connsiteX1" fmla="*/ 1260000 w 1440000"/>
+              <a:gd name="connsiteY1" fmla="*/ 0 h 1548000"/>
+              <a:gd name="connsiteX2" fmla="*/ 1260000 w 1440000"/>
+              <a:gd name="connsiteY2" fmla="*/ 108000 h 1548000"/>
+              <a:gd name="connsiteX3" fmla="*/ 1440000 w 1440000"/>
+              <a:gd name="connsiteY3" fmla="*/ 108000 h 1548000"/>
+              <a:gd name="connsiteX4" fmla="*/ 1440000 w 1440000"/>
+              <a:gd name="connsiteY4" fmla="*/ 1548000 h 1548000"/>
+              <a:gd name="connsiteX5" fmla="*/ 0 w 1440000"/>
+              <a:gd name="connsiteY5" fmla="*/ 1548000 h 1548000"/>
+              <a:gd name="connsiteX6" fmla="*/ 0 w 1440000"/>
+              <a:gd name="connsiteY6" fmla="*/ 108000 h 1548000"/>
+              <a:gd name="connsiteX7" fmla="*/ 180000 w 1440000"/>
+              <a:gd name="connsiteY7" fmla="*/ 108000 h 1548000"/>
+            </a:gdLst>
+            <a:ahLst/>
+            <a:cxnLst>
+              <a:cxn ang="0">
+                <a:pos x="connsiteX0" y="connsiteY0"/>
+              </a:cxn>
+              <a:cxn ang="0">
+                <a:pos x="connsiteX1" y="connsiteY1"/>
+              </a:cxn>
+              <a:cxn ang="0">
+                <a:pos x="connsiteX2" y="connsiteY2"/>
+              </a:cxn>
+              <a:cxn ang="0">
+                <a:pos x="connsiteX3" y="connsiteY3"/>
+              </a:cxn>
+              <a:cxn ang="0">
+                <a:pos x="connsiteX4" y="connsiteY4"/>
+              </a:cxn>
+              <a:cxn ang="0">
+                <a:pos x="connsiteX5" y="connsiteY5"/>
+              </a:cxn>
+              <a:cxn ang="0">
+                <a:pos x="connsiteX6" y="connsiteY6"/>
+              </a:cxn>
+              <a:cxn ang="0">
+                <a:pos x="connsiteX7" y="connsiteY7"/>
+              </a:cxn>
+            </a:cxnLst>
+            <a:rect l="l" t="t" r="r" b="b"/>
+            <a:pathLst>
+              <a:path w="1440000" h="1548000">
+                <a:moveTo>
+                  <a:pt x="180000" y="0"/>
+                </a:moveTo>
+                <a:lnTo>
+                  <a:pt x="1260000" y="0"/>
+                </a:lnTo>
+                <a:lnTo>
+                  <a:pt x="1260000" y="108000"/>
+                </a:lnTo>
+                <a:lnTo>
+                  <a:pt x="1440000" y="108000"/>
+                </a:lnTo>
+                <a:lnTo>
+                  <a:pt x="1440000" y="1548000"/>
+                </a:lnTo>
+                <a:lnTo>
+                  <a:pt x="0" y="1548000"/>
+                </a:lnTo>
+                <a:lnTo>
+                  <a:pt x="0" y="108000"/>
+                </a:lnTo>
+                <a:lnTo>
+                  <a:pt x="180000" y="108000"/>
+                </a:lnTo>
+                <a:close/>
+              </a:path>
+            </a:pathLst>
+          </a:custGeom>
+          <a:solidFill>
+            <a:schemeClr val="bg1"/>
+          </a:solidFill>
+          <a:ln w="3175">
+            <a:solidFill>
+              <a:srgbClr val="FF0000"/>
+            </a:solidFill>
+          </a:ln>
+        </p:spPr>
+        <p:style>
+          <a:lnRef idx="2">
+            <a:schemeClr val="accent1">
+              <a:shade val="50000"/>
+            </a:schemeClr>
+          </a:lnRef>
+          <a:fillRef idx="1">
+            <a:schemeClr val="accent1"/>
+          </a:fillRef>
+          <a:effectRef idx="0">
+            <a:schemeClr val="accent1"/>
+          </a:effectRef>
+          <a:fontRef idx="minor">
+            <a:schemeClr val="lt1"/>
+          </a:fontRef>
+        </p:style>
+        <p:txBody>
+          <a:bodyPr rtlCol="0" anchor="ctr"/>
+          <a:lstStyle/>
+          <a:p>
+            <a:pPr algn="ctr"/>
+            <a:endParaRPr lang="en-NZ"/>
+          </a:p>
+        </p:txBody>
+      </p:sp>
+      <p:sp>
+        <p:nvSpPr>
+          <p:cNvPr id="29" name="Freeform 28"/>
+          <p:cNvSpPr/>
+          <p:nvPr/>
+        </p:nvSpPr>
+        <p:spPr>
+          <a:xfrm>
+            <a:off x="5212602" y="2342603"/>
+            <a:ext cx="1440000" cy="1548000"/>
+          </a:xfrm>
+          <a:custGeom>
+            <a:avLst/>
+            <a:gdLst>
+              <a:gd name="connsiteX0" fmla="*/ 180000 w 1440000"/>
+              <a:gd name="connsiteY0" fmla="*/ 0 h 1548000"/>
+              <a:gd name="connsiteX1" fmla="*/ 1260000 w 1440000"/>
+              <a:gd name="connsiteY1" fmla="*/ 0 h 1548000"/>
+              <a:gd name="connsiteX2" fmla="*/ 1260000 w 1440000"/>
+              <a:gd name="connsiteY2" fmla="*/ 108000 h 1548000"/>
+              <a:gd name="connsiteX3" fmla="*/ 1440000 w 1440000"/>
+              <a:gd name="connsiteY3" fmla="*/ 108000 h 1548000"/>
+              <a:gd name="connsiteX4" fmla="*/ 1440000 w 1440000"/>
+              <a:gd name="connsiteY4" fmla="*/ 1548000 h 1548000"/>
+              <a:gd name="connsiteX5" fmla="*/ 0 w 1440000"/>
+              <a:gd name="connsiteY5" fmla="*/ 1548000 h 1548000"/>
+              <a:gd name="connsiteX6" fmla="*/ 0 w 1440000"/>
+              <a:gd name="connsiteY6" fmla="*/ 108000 h 1548000"/>
+              <a:gd name="connsiteX7" fmla="*/ 180000 w 1440000"/>
+              <a:gd name="connsiteY7" fmla="*/ 108000 h 1548000"/>
+            </a:gdLst>
+            <a:ahLst/>
+            <a:cxnLst>
+              <a:cxn ang="0">
+                <a:pos x="connsiteX0" y="connsiteY0"/>
+              </a:cxn>
+              <a:cxn ang="0">
+                <a:pos x="connsiteX1" y="connsiteY1"/>
+              </a:cxn>
+              <a:cxn ang="0">
+                <a:pos x="connsiteX2" y="connsiteY2"/>
+              </a:cxn>
+              <a:cxn ang="0">
+                <a:pos x="connsiteX3" y="connsiteY3"/>
+              </a:cxn>
+              <a:cxn ang="0">
+                <a:pos x="connsiteX4" y="connsiteY4"/>
+              </a:cxn>
+              <a:cxn ang="0">
+                <a:pos x="connsiteX5" y="connsiteY5"/>
+              </a:cxn>
+              <a:cxn ang="0">
+                <a:pos x="connsiteX6" y="connsiteY6"/>
+              </a:cxn>
+              <a:cxn ang="0">
+                <a:pos x="connsiteX7" y="connsiteY7"/>
+              </a:cxn>
+            </a:cxnLst>
+            <a:rect l="l" t="t" r="r" b="b"/>
+            <a:pathLst>
+              <a:path w="1440000" h="1548000">
+                <a:moveTo>
+                  <a:pt x="180000" y="0"/>
+                </a:moveTo>
+                <a:lnTo>
+                  <a:pt x="1260000" y="0"/>
+                </a:lnTo>
+                <a:lnTo>
+                  <a:pt x="1260000" y="108000"/>
+                </a:lnTo>
+                <a:lnTo>
+                  <a:pt x="1440000" y="108000"/>
+                </a:lnTo>
+                <a:lnTo>
+                  <a:pt x="1440000" y="1548000"/>
+                </a:lnTo>
+                <a:lnTo>
+                  <a:pt x="0" y="1548000"/>
+                </a:lnTo>
+                <a:lnTo>
+                  <a:pt x="0" y="108000"/>
+                </a:lnTo>
+                <a:lnTo>
+                  <a:pt x="180000" y="108000"/>
+                </a:lnTo>
+                <a:close/>
+              </a:path>
+            </a:pathLst>
+          </a:custGeom>
+          <a:solidFill>
+            <a:schemeClr val="bg1"/>
+          </a:solidFill>
+          <a:ln w="3175">
+            <a:solidFill>
+              <a:srgbClr val="FF0000"/>
+            </a:solidFill>
+          </a:ln>
+        </p:spPr>
+        <p:style>
+          <a:lnRef idx="2">
+            <a:schemeClr val="accent1">
+              <a:shade val="50000"/>
+            </a:schemeClr>
+          </a:lnRef>
+          <a:fillRef idx="1">
+            <a:schemeClr val="accent1"/>
+          </a:fillRef>
+          <a:effectRef idx="0">
+            <a:schemeClr val="accent1"/>
+          </a:effectRef>
+          <a:fontRef idx="minor">
+            <a:schemeClr val="lt1"/>
+          </a:fontRef>
+        </p:style>
+        <p:txBody>
+          <a:bodyPr rtlCol="0" anchor="ctr"/>
+          <a:lstStyle/>
+          <a:p>
+            <a:pPr algn="ctr"/>
+            <a:endParaRPr lang="en-NZ"/>
+          </a:p>
+        </p:txBody>
+      </p:sp>
+      <p:sp>
+        <p:nvSpPr>
+          <p:cNvPr id="30" name="Freeform 29"/>
+          <p:cNvSpPr/>
+          <p:nvPr/>
+        </p:nvSpPr>
+        <p:spPr>
+          <a:xfrm>
+            <a:off x="5212602" y="3890603"/>
+            <a:ext cx="1440000" cy="1548000"/>
+          </a:xfrm>
+          <a:custGeom>
+            <a:avLst/>
+            <a:gdLst>
+              <a:gd name="connsiteX0" fmla="*/ 180000 w 1440000"/>
+              <a:gd name="connsiteY0" fmla="*/ 0 h 1548000"/>
+              <a:gd name="connsiteX1" fmla="*/ 1260000 w 1440000"/>
+              <a:gd name="connsiteY1" fmla="*/ 0 h 1548000"/>
+              <a:gd name="connsiteX2" fmla="*/ 1260000 w 1440000"/>
+              <a:gd name="connsiteY2" fmla="*/ 108000 h 1548000"/>
+              <a:gd name="connsiteX3" fmla="*/ 1440000 w 1440000"/>
+              <a:gd name="connsiteY3" fmla="*/ 108000 h 1548000"/>
+              <a:gd name="connsiteX4" fmla="*/ 1440000 w 1440000"/>
+              <a:gd name="connsiteY4" fmla="*/ 1548000 h 1548000"/>
+              <a:gd name="connsiteX5" fmla="*/ 0 w 1440000"/>
+              <a:gd name="connsiteY5" fmla="*/ 1548000 h 1548000"/>
+              <a:gd name="connsiteX6" fmla="*/ 0 w 1440000"/>
+              <a:gd name="connsiteY6" fmla="*/ 108000 h 1548000"/>
+              <a:gd name="connsiteX7" fmla="*/ 180000 w 1440000"/>
+              <a:gd name="connsiteY7" fmla="*/ 108000 h 1548000"/>
+            </a:gdLst>
+            <a:ahLst/>
+            <a:cxnLst>
+              <a:cxn ang="0">
+                <a:pos x="connsiteX0" y="connsiteY0"/>
+              </a:cxn>
+              <a:cxn ang="0">
+                <a:pos x="connsiteX1" y="connsiteY1"/>
+              </a:cxn>
+              <a:cxn ang="0">
+                <a:pos x="connsiteX2" y="connsiteY2"/>
+              </a:cxn>
+              <a:cxn ang="0">
+                <a:pos x="connsiteX3" y="connsiteY3"/>
+              </a:cxn>
+              <a:cxn ang="0">
+                <a:pos x="connsiteX4" y="connsiteY4"/>
+              </a:cxn>
+              <a:cxn ang="0">
+                <a:pos x="connsiteX5" y="connsiteY5"/>
+              </a:cxn>
+              <a:cxn ang="0">
+                <a:pos x="connsiteX6" y="connsiteY6"/>
+              </a:cxn>
+              <a:cxn ang="0">
+                <a:pos x="connsiteX7" y="connsiteY7"/>
+              </a:cxn>
+            </a:cxnLst>
+            <a:rect l="l" t="t" r="r" b="b"/>
+            <a:pathLst>
+              <a:path w="1440000" h="1548000">
+                <a:moveTo>
+                  <a:pt x="180000" y="0"/>
+                </a:moveTo>
+                <a:lnTo>
+                  <a:pt x="1260000" y="0"/>
+                </a:lnTo>
+                <a:lnTo>
+                  <a:pt x="1260000" y="108000"/>
+                </a:lnTo>
+                <a:lnTo>
+                  <a:pt x="1440000" y="108000"/>
+                </a:lnTo>
+                <a:lnTo>
+                  <a:pt x="1440000" y="1548000"/>
+                </a:lnTo>
+                <a:lnTo>
+                  <a:pt x="0" y="1548000"/>
+                </a:lnTo>
+                <a:lnTo>
+                  <a:pt x="0" y="108000"/>
+                </a:lnTo>
+                <a:lnTo>
+                  <a:pt x="180000" y="108000"/>
+                </a:lnTo>
+                <a:close/>
+              </a:path>
+            </a:pathLst>
+          </a:custGeom>
+          <a:solidFill>
+            <a:schemeClr val="bg1"/>
+          </a:solidFill>
+          <a:ln w="3175">
+            <a:solidFill>
+              <a:srgbClr val="FF0000"/>
+            </a:solidFill>
+          </a:ln>
+        </p:spPr>
+        <p:style>
+          <a:lnRef idx="2">
+            <a:schemeClr val="accent1">
+              <a:shade val="50000"/>
+            </a:schemeClr>
+          </a:lnRef>
+          <a:fillRef idx="1">
+            <a:schemeClr val="accent1"/>
+          </a:fillRef>
+          <a:effectRef idx="0">
+            <a:schemeClr val="accent1"/>
+          </a:effectRef>
+          <a:fontRef idx="minor">
+            <a:schemeClr val="lt1"/>
+          </a:fontRef>
+        </p:style>
+        <p:txBody>
+          <a:bodyPr rtlCol="0" anchor="ctr"/>
+          <a:lstStyle/>
+          <a:p>
+            <a:pPr algn="ctr"/>
+            <a:endParaRPr lang="en-NZ"/>
+          </a:p>
+        </p:txBody>
+      </p:sp>
+      <p:sp>
+        <p:nvSpPr>
+          <p:cNvPr id="31" name="Freeform 30"/>
+          <p:cNvSpPr/>
+          <p:nvPr/>
+        </p:nvSpPr>
+        <p:spPr>
+          <a:xfrm>
+            <a:off x="5212602" y="5438603"/>
+            <a:ext cx="1440000" cy="1548000"/>
+          </a:xfrm>
+          <a:custGeom>
+            <a:avLst/>
+            <a:gdLst>
+              <a:gd name="connsiteX0" fmla="*/ 180000 w 1440000"/>
+              <a:gd name="connsiteY0" fmla="*/ 0 h 1548000"/>
+              <a:gd name="connsiteX1" fmla="*/ 1260000 w 1440000"/>
+              <a:gd name="connsiteY1" fmla="*/ 0 h 1548000"/>
+              <a:gd name="connsiteX2" fmla="*/ 1260000 w 1440000"/>
+              <a:gd name="connsiteY2" fmla="*/ 108000 h 1548000"/>
+              <a:gd name="connsiteX3" fmla="*/ 1440000 w 1440000"/>
+              <a:gd name="connsiteY3" fmla="*/ 108000 h 1548000"/>
+              <a:gd name="connsiteX4" fmla="*/ 1440000 w 1440000"/>
+              <a:gd name="connsiteY4" fmla="*/ 1548000 h 1548000"/>
+              <a:gd name="connsiteX5" fmla="*/ 0 w 1440000"/>
+              <a:gd name="connsiteY5" fmla="*/ 1548000 h 1548000"/>
+              <a:gd name="connsiteX6" fmla="*/ 0 w 1440000"/>
+              <a:gd name="connsiteY6" fmla="*/ 108000 h 1548000"/>
+              <a:gd name="connsiteX7" fmla="*/ 180000 w 1440000"/>
+              <a:gd name="connsiteY7" fmla="*/ 108000 h 1548000"/>
+            </a:gdLst>
+            <a:ahLst/>
+            <a:cxnLst>
+              <a:cxn ang="0">
+                <a:pos x="connsiteX0" y="connsiteY0"/>
+              </a:cxn>
+              <a:cxn ang="0">
+                <a:pos x="connsiteX1" y="connsiteY1"/>
+              </a:cxn>
+              <a:cxn ang="0">
+                <a:pos x="connsiteX2" y="connsiteY2"/>
+              </a:cxn>
+              <a:cxn ang="0">
+                <a:pos x="connsiteX3" y="connsiteY3"/>
+              </a:cxn>
+              <a:cxn ang="0">
+                <a:pos x="connsiteX4" y="connsiteY4"/>
+              </a:cxn>
+              <a:cxn ang="0">
+                <a:pos x="connsiteX5" y="connsiteY5"/>
+              </a:cxn>
+              <a:cxn ang="0">
+                <a:pos x="connsiteX6" y="connsiteY6"/>
+              </a:cxn>
+              <a:cxn ang="0">
+                <a:pos x="connsiteX7" y="connsiteY7"/>
+              </a:cxn>
+            </a:cxnLst>
+            <a:rect l="l" t="t" r="r" b="b"/>
+            <a:pathLst>
+              <a:path w="1440000" h="1548000">
+                <a:moveTo>
+                  <a:pt x="180000" y="0"/>
+                </a:moveTo>
+                <a:lnTo>
+                  <a:pt x="1260000" y="0"/>
+                </a:lnTo>
+                <a:lnTo>
+                  <a:pt x="1260000" y="108000"/>
+                </a:lnTo>
+                <a:lnTo>
+                  <a:pt x="1440000" y="108000"/>
+                </a:lnTo>
+                <a:lnTo>
+                  <a:pt x="1440000" y="1548000"/>
+                </a:lnTo>
+                <a:lnTo>
+                  <a:pt x="0" y="1548000"/>
+                </a:lnTo>
+                <a:lnTo>
+                  <a:pt x="0" y="108000"/>
+                </a:lnTo>
+                <a:lnTo>
+                  <a:pt x="180000" y="108000"/>
+                </a:lnTo>
+                <a:close/>
+              </a:path>
+            </a:pathLst>
+          </a:custGeom>
+          <a:solidFill>
+            <a:schemeClr val="bg1"/>
+          </a:solidFill>
+          <a:ln w="3175">
+            <a:solidFill>
+              <a:srgbClr val="FF0000"/>
+            </a:solidFill>
+          </a:ln>
+        </p:spPr>
+        <p:style>
+          <a:lnRef idx="2">
+            <a:schemeClr val="accent1">
+              <a:shade val="50000"/>
+            </a:schemeClr>
+          </a:lnRef>
+          <a:fillRef idx="1">
+            <a:schemeClr val="accent1"/>
+          </a:fillRef>
+          <a:effectRef idx="0">
+            <a:schemeClr val="accent1"/>
+          </a:effectRef>
+          <a:fontRef idx="minor">
+            <a:schemeClr val="lt1"/>
+          </a:fontRef>
+        </p:style>
+        <p:txBody>
+          <a:bodyPr rtlCol="0" anchor="ctr"/>
+          <a:lstStyle/>
+          <a:p>
+            <a:pPr algn="ctr"/>
+            <a:endParaRPr lang="en-NZ"/>
+          </a:p>
+        </p:txBody>
+      </p:sp>
+    </p:spTree>
+    <p:extLst>
+      <p:ext uri="{BB962C8B-B14F-4D97-AF65-F5344CB8AC3E}">
+        <p14:creationId xmlns:p14="http://schemas.microsoft.com/office/powerpoint/2010/main" val="45734184"/>
+      </p:ext>
+    </p:extLst>
+  </p:cSld>
+  <p:clrMapOvr>
+    <a:masterClrMapping/>
+  </p:clrMapOvr>
+</p:sld>
+</file>
+
+<file path=ppt/slides/slide3.xml><?xml version="1.0" encoding="utf-8"?>
+<p:sld xmlns:a="http://schemas.openxmlformats.org/drawingml/2006/main" xmlns:r="http://schemas.openxmlformats.org/officeDocument/2006/relationships" xmlns:p="http://schemas.openxmlformats.org/presentationml/2006/main">
+  <p:cSld>
+    <p:spTree>
+      <p:nvGrpSpPr>
+        <p:cNvPr id="1" name=""/>
+        <p:cNvGrpSpPr/>
+        <p:nvPr/>
+      </p:nvGrpSpPr>
+      <p:grpSpPr>
+        <a:xfrm>
+          <a:off x="0" y="0"/>
+          <a:ext cx="0" cy="0"/>
+          <a:chOff x="0" y="0"/>
+          <a:chExt cx="0" cy="0"/>
+        </a:xfrm>
+      </p:grpSpPr>
+      <p:pic>
+        <p:nvPicPr>
+          <p:cNvPr id="80" name="Picture 79"/>
+          <p:cNvPicPr>
+            <a:picLocks noChangeAspect="1"/>
+          </p:cNvPicPr>
+          <p:nvPr/>
+        </p:nvPicPr>
+        <p:blipFill>
+          <a:blip r:embed="rId2"/>
+          <a:stretch>
+            <a:fillRect/>
+          </a:stretch>
+        </p:blipFill>
+        <p:spPr>
+          <a:xfrm>
+            <a:off x="507128" y="1386161"/>
+            <a:ext cx="2042337" cy="2109399"/>
+          </a:xfrm>
+          <a:prstGeom prst="rect">
+            <a:avLst/>
+          </a:prstGeom>
+        </p:spPr>
+      </p:pic>
+      <p:pic>
+        <p:nvPicPr>
+          <p:cNvPr id="81" name="Picture 80"/>
+          <p:cNvPicPr>
+            <a:picLocks noChangeAspect="1"/>
+          </p:cNvPicPr>
+          <p:nvPr/>
+        </p:nvPicPr>
+        <p:blipFill>
+          <a:blip r:embed="rId2"/>
+          <a:stretch>
+            <a:fillRect/>
+          </a:stretch>
+        </p:blipFill>
+        <p:spPr>
+          <a:xfrm>
+            <a:off x="5291691" y="2725146"/>
+            <a:ext cx="1346748" cy="1390970"/>
+          </a:xfrm>
+          <a:prstGeom prst="rect">
+            <a:avLst/>
+          </a:prstGeom>
+        </p:spPr>
+      </p:pic>
+    </p:spTree>
+    <p:extLst>
+      <p:ext uri="{BB962C8B-B14F-4D97-AF65-F5344CB8AC3E}">
+        <p14:creationId xmlns:p14="http://schemas.microsoft.com/office/powerpoint/2010/main" val="798642477"/>
+      </p:ext>
+    </p:extLst>
+  </p:cSld>
+  <p:clrMapOvr>
+    <a:masterClrMapping/>
+  </p:clrMapOvr>
+</p:sld>
+</file>
+
+<file path=ppt/slides/slide4.xml><?xml version="1.0" encoding="utf-8"?>
+<p:sld xmlns:a="http://schemas.openxmlformats.org/drawingml/2006/main" xmlns:r="http://schemas.openxmlformats.org/officeDocument/2006/relationships" xmlns:p="http://schemas.openxmlformats.org/presentationml/2006/main">
+  <p:cSld>
+    <p:spTree>
+      <p:nvGrpSpPr>
+        <p:cNvPr id="1" name=""/>
+        <p:cNvGrpSpPr/>
+        <p:nvPr/>
+      </p:nvGrpSpPr>
+      <p:grpSpPr>
+        <a:xfrm>
+          <a:off x="0" y="0"/>
+          <a:ext cx="0" cy="0"/>
+          <a:chOff x="0" y="0"/>
+          <a:chExt cx="0" cy="0"/>
+        </a:xfrm>
+      </p:grpSpPr>
+      <p:sp>
+        <p:nvSpPr>
+          <p:cNvPr id="17" name="Rectangle 16"/>
+          <p:cNvSpPr/>
+          <p:nvPr/>
+        </p:nvSpPr>
+        <p:spPr>
+          <a:xfrm>
             <a:off x="163077" y="804589"/>
             <a:ext cx="5040000" cy="8204544"/>
           </a:xfrm>
@@ -4480,1308 +5420,6 @@
           </a:p>
         </p:txBody>
       </p:sp>
-      <p:grpSp>
-        <p:nvGrpSpPr>
-          <p:cNvPr id="6" name="Group 5"/>
-          <p:cNvGrpSpPr/>
-          <p:nvPr/>
-        </p:nvGrpSpPr>
-        <p:grpSpPr>
-          <a:xfrm>
-            <a:off x="8150444" y="4215080"/>
-            <a:ext cx="2039441" cy="2028697"/>
-            <a:chOff x="463769" y="1271855"/>
-            <a:chExt cx="2039441" cy="2028697"/>
-          </a:xfrm>
-        </p:grpSpPr>
-        <p:grpSp>
-          <p:nvGrpSpPr>
-            <p:cNvPr id="15" name="Group 14"/>
-            <p:cNvGrpSpPr/>
-            <p:nvPr/>
-          </p:nvGrpSpPr>
-          <p:grpSpPr>
-            <a:xfrm>
-              <a:off x="878439" y="1271855"/>
-              <a:ext cx="1552637" cy="1986530"/>
-              <a:chOff x="1141862" y="945019"/>
-              <a:chExt cx="1552637" cy="1986530"/>
-            </a:xfrm>
-          </p:grpSpPr>
-          <p:sp>
-            <p:nvSpPr>
-              <p:cNvPr id="16" name="Arc 15"/>
-              <p:cNvSpPr/>
-              <p:nvPr/>
-            </p:nvSpPr>
-            <p:spPr>
-              <a:xfrm>
-                <a:off x="1928884" y="1878842"/>
-                <a:ext cx="537561" cy="846160"/>
-              </a:xfrm>
-              <a:prstGeom prst="arc">
-                <a:avLst>
-                  <a:gd name="adj1" fmla="val 13115904"/>
-                  <a:gd name="adj2" fmla="val 0"/>
-                </a:avLst>
-              </a:prstGeom>
-              <a:ln w="12700">
-                <a:solidFill>
-                  <a:schemeClr val="tx1"/>
-                </a:solidFill>
-              </a:ln>
-            </p:spPr>
-            <p:style>
-              <a:lnRef idx="1">
-                <a:schemeClr val="accent1"/>
-              </a:lnRef>
-              <a:fillRef idx="0">
-                <a:schemeClr val="accent1"/>
-              </a:fillRef>
-              <a:effectRef idx="0">
-                <a:schemeClr val="accent1"/>
-              </a:effectRef>
-              <a:fontRef idx="minor">
-                <a:schemeClr val="tx1"/>
-              </a:fontRef>
-            </p:style>
-            <p:txBody>
-              <a:bodyPr rtlCol="0" anchor="ctr"/>
-              <a:lstStyle/>
-              <a:p>
-                <a:pPr algn="ctr"/>
-                <a:endParaRPr lang="en-NZ"/>
-              </a:p>
-            </p:txBody>
-          </p:sp>
-          <p:sp>
-            <p:nvSpPr>
-              <p:cNvPr id="18" name="Arc 17"/>
-              <p:cNvSpPr/>
-              <p:nvPr/>
-            </p:nvSpPr>
-            <p:spPr>
-              <a:xfrm>
-                <a:off x="2016025" y="1924333"/>
-                <a:ext cx="404178" cy="800669"/>
-              </a:xfrm>
-              <a:prstGeom prst="arc">
-                <a:avLst>
-                  <a:gd name="adj1" fmla="val 13115904"/>
-                  <a:gd name="adj2" fmla="val 0"/>
-                </a:avLst>
-              </a:prstGeom>
-              <a:ln w="12700">
-                <a:solidFill>
-                  <a:schemeClr val="tx1"/>
-                </a:solidFill>
-              </a:ln>
-            </p:spPr>
-            <p:style>
-              <a:lnRef idx="1">
-                <a:schemeClr val="accent1"/>
-              </a:lnRef>
-              <a:fillRef idx="0">
-                <a:schemeClr val="accent1"/>
-              </a:fillRef>
-              <a:effectRef idx="0">
-                <a:schemeClr val="accent1"/>
-              </a:effectRef>
-              <a:fontRef idx="minor">
-                <a:schemeClr val="tx1"/>
-              </a:fontRef>
-            </p:style>
-            <p:txBody>
-              <a:bodyPr rtlCol="0" anchor="ctr"/>
-              <a:lstStyle/>
-              <a:p>
-                <a:pPr algn="ctr"/>
-                <a:endParaRPr lang="en-NZ"/>
-              </a:p>
-            </p:txBody>
-          </p:sp>
-          <p:sp>
-            <p:nvSpPr>
-              <p:cNvPr id="19" name="Arc 18"/>
-              <p:cNvSpPr/>
-              <p:nvPr/>
-            </p:nvSpPr>
-            <p:spPr>
-              <a:xfrm>
-                <a:off x="1248062" y="1438784"/>
-                <a:ext cx="462457" cy="1492765"/>
-              </a:xfrm>
-              <a:prstGeom prst="arc">
-                <a:avLst/>
-              </a:prstGeom>
-              <a:ln w="38100">
-                <a:solidFill>
-                  <a:schemeClr val="tx1"/>
-                </a:solidFill>
-              </a:ln>
-            </p:spPr>
-            <p:style>
-              <a:lnRef idx="1">
-                <a:schemeClr val="accent1"/>
-              </a:lnRef>
-              <a:fillRef idx="0">
-                <a:schemeClr val="accent1"/>
-              </a:fillRef>
-              <a:effectRef idx="0">
-                <a:schemeClr val="accent1"/>
-              </a:effectRef>
-              <a:fontRef idx="minor">
-                <a:schemeClr val="tx1"/>
-              </a:fontRef>
-            </p:style>
-            <p:txBody>
-              <a:bodyPr rtlCol="0" anchor="ctr"/>
-              <a:lstStyle/>
-              <a:p>
-                <a:pPr algn="ctr"/>
-                <a:endParaRPr lang="en-NZ"/>
-              </a:p>
-            </p:txBody>
-          </p:sp>
-          <p:sp>
-            <p:nvSpPr>
-              <p:cNvPr id="20" name="Trapezoid 19"/>
-              <p:cNvSpPr/>
-              <p:nvPr/>
-            </p:nvSpPr>
-            <p:spPr>
-              <a:xfrm flipV="1">
-                <a:off x="1246497" y="2572258"/>
-                <a:ext cx="954484" cy="107252"/>
-              </a:xfrm>
-              <a:prstGeom prst="trapezoid">
-                <a:avLst>
-                  <a:gd name="adj" fmla="val 14245"/>
-                </a:avLst>
-              </a:prstGeom>
-              <a:pattFill prst="trellis">
-                <a:fgClr>
-                  <a:schemeClr val="tx1"/>
-                </a:fgClr>
-                <a:bgClr>
-                  <a:schemeClr val="bg1"/>
-                </a:bgClr>
-              </a:pattFill>
-              <a:ln>
-                <a:solidFill>
-                  <a:schemeClr val="tx1"/>
-                </a:solidFill>
-              </a:ln>
-            </p:spPr>
-            <p:style>
-              <a:lnRef idx="2">
-                <a:schemeClr val="accent1">
-                  <a:shade val="50000"/>
-                </a:schemeClr>
-              </a:lnRef>
-              <a:fillRef idx="1">
-                <a:schemeClr val="accent1"/>
-              </a:fillRef>
-              <a:effectRef idx="0">
-                <a:schemeClr val="accent1"/>
-              </a:effectRef>
-              <a:fontRef idx="minor">
-                <a:schemeClr val="lt1"/>
-              </a:fontRef>
-            </p:style>
-            <p:txBody>
-              <a:bodyPr rtlCol="0" anchor="ctr"/>
-              <a:lstStyle/>
-              <a:p>
-                <a:pPr algn="ctr"/>
-                <a:endParaRPr lang="en-NZ"/>
-              </a:p>
-            </p:txBody>
-          </p:sp>
-          <p:sp>
-            <p:nvSpPr>
-              <p:cNvPr id="21" name="Freeform 20"/>
-              <p:cNvSpPr/>
-              <p:nvPr/>
-            </p:nvSpPr>
-            <p:spPr>
-              <a:xfrm flipV="1">
-                <a:off x="1246496" y="2033515"/>
-                <a:ext cx="954484" cy="538743"/>
-              </a:xfrm>
-              <a:custGeom>
-                <a:avLst/>
-                <a:gdLst>
-                  <a:gd name="connsiteX0" fmla="*/ 0 w 954484"/>
-                  <a:gd name="connsiteY0" fmla="*/ 538743 h 538743"/>
-                  <a:gd name="connsiteX1" fmla="*/ 954484 w 954484"/>
-                  <a:gd name="connsiteY1" fmla="*/ 538743 h 538743"/>
-                  <a:gd name="connsiteX2" fmla="*/ 949360 w 954484"/>
-                  <a:gd name="connsiteY2" fmla="*/ 483723 h 538743"/>
-                  <a:gd name="connsiteX3" fmla="*/ 908564 w 954484"/>
-                  <a:gd name="connsiteY3" fmla="*/ 483723 h 538743"/>
-                  <a:gd name="connsiteX4" fmla="*/ 787633 w 954484"/>
-                  <a:gd name="connsiteY4" fmla="*/ 0 h 538743"/>
-                  <a:gd name="connsiteX5" fmla="*/ 166852 w 954484"/>
-                  <a:gd name="connsiteY5" fmla="*/ 0 h 538743"/>
-                  <a:gd name="connsiteX6" fmla="*/ 45921 w 954484"/>
-                  <a:gd name="connsiteY6" fmla="*/ 483723 h 538743"/>
-                  <a:gd name="connsiteX7" fmla="*/ 5124 w 954484"/>
-                  <a:gd name="connsiteY7" fmla="*/ 483723 h 538743"/>
-                </a:gdLst>
-                <a:ahLst/>
-                <a:cxnLst>
-                  <a:cxn ang="0">
-                    <a:pos x="connsiteX0" y="connsiteY0"/>
-                  </a:cxn>
-                  <a:cxn ang="0">
-                    <a:pos x="connsiteX1" y="connsiteY1"/>
-                  </a:cxn>
-                  <a:cxn ang="0">
-                    <a:pos x="connsiteX2" y="connsiteY2"/>
-                  </a:cxn>
-                  <a:cxn ang="0">
-                    <a:pos x="connsiteX3" y="connsiteY3"/>
-                  </a:cxn>
-                  <a:cxn ang="0">
-                    <a:pos x="connsiteX4" y="connsiteY4"/>
-                  </a:cxn>
-                  <a:cxn ang="0">
-                    <a:pos x="connsiteX5" y="connsiteY5"/>
-                  </a:cxn>
-                  <a:cxn ang="0">
-                    <a:pos x="connsiteX6" y="connsiteY6"/>
-                  </a:cxn>
-                  <a:cxn ang="0">
-                    <a:pos x="connsiteX7" y="connsiteY7"/>
-                  </a:cxn>
-                </a:cxnLst>
-                <a:rect l="l" t="t" r="r" b="b"/>
-                <a:pathLst>
-                  <a:path w="954484" h="538743">
-                    <a:moveTo>
-                      <a:pt x="0" y="538743"/>
-                    </a:moveTo>
-                    <a:lnTo>
-                      <a:pt x="954484" y="538743"/>
-                    </a:lnTo>
-                    <a:lnTo>
-                      <a:pt x="949360" y="483723"/>
-                    </a:lnTo>
-                    <a:lnTo>
-                      <a:pt x="908564" y="483723"/>
-                    </a:lnTo>
-                    <a:lnTo>
-                      <a:pt x="787633" y="0"/>
-                    </a:lnTo>
-                    <a:lnTo>
-                      <a:pt x="166852" y="0"/>
-                    </a:lnTo>
-                    <a:lnTo>
-                      <a:pt x="45921" y="483723"/>
-                    </a:lnTo>
-                    <a:lnTo>
-                      <a:pt x="5124" y="483723"/>
-                    </a:lnTo>
-                    <a:close/>
-                  </a:path>
-                </a:pathLst>
-              </a:custGeom>
-              <a:pattFill prst="trellis">
-                <a:fgClr>
-                  <a:schemeClr val="tx1"/>
-                </a:fgClr>
-                <a:bgClr>
-                  <a:schemeClr val="bg1"/>
-                </a:bgClr>
-              </a:pattFill>
-              <a:ln>
-                <a:solidFill>
-                  <a:schemeClr val="tx1"/>
-                </a:solidFill>
-              </a:ln>
-            </p:spPr>
-            <p:style>
-              <a:lnRef idx="2">
-                <a:schemeClr val="accent1">
-                  <a:shade val="50000"/>
-                </a:schemeClr>
-              </a:lnRef>
-              <a:fillRef idx="1">
-                <a:schemeClr val="accent1"/>
-              </a:fillRef>
-              <a:effectRef idx="0">
-                <a:schemeClr val="accent1"/>
-              </a:effectRef>
-              <a:fontRef idx="minor">
-                <a:schemeClr val="lt1"/>
-              </a:fontRef>
-            </p:style>
-            <p:txBody>
-              <a:bodyPr rtlCol="0" anchor="ctr"/>
-              <a:lstStyle/>
-              <a:p>
-                <a:pPr algn="ctr"/>
-                <a:endParaRPr lang="en-NZ"/>
-              </a:p>
-            </p:txBody>
-          </p:sp>
-          <p:grpSp>
-            <p:nvGrpSpPr>
-              <p:cNvPr id="22" name="Group 21"/>
-              <p:cNvGrpSpPr/>
-              <p:nvPr/>
-            </p:nvGrpSpPr>
-            <p:grpSpPr>
-              <a:xfrm>
-                <a:off x="1141862" y="945019"/>
-                <a:ext cx="752901" cy="752901"/>
-                <a:chOff x="2988859" y="1235122"/>
-                <a:chExt cx="752901" cy="752901"/>
-              </a:xfrm>
-            </p:grpSpPr>
-            <p:grpSp>
-              <p:nvGrpSpPr>
-                <p:cNvPr id="29" name="Group 28"/>
-                <p:cNvGrpSpPr/>
-                <p:nvPr/>
-              </p:nvGrpSpPr>
-              <p:grpSpPr>
-                <a:xfrm>
-                  <a:off x="2988859" y="1237397"/>
-                  <a:ext cx="750627" cy="746077"/>
-                  <a:chOff x="2988859" y="1237397"/>
-                  <a:chExt cx="750627" cy="746077"/>
-                </a:xfrm>
-                <a:pattFill prst="pct25">
-                  <a:fgClr>
-                    <a:schemeClr val="tx1"/>
-                  </a:fgClr>
-                  <a:bgClr>
-                    <a:schemeClr val="bg1"/>
-                  </a:bgClr>
-                </a:pattFill>
-              </p:grpSpPr>
-              <p:sp>
-                <p:nvSpPr>
-                  <p:cNvPr id="41" name="Oval 40"/>
-                  <p:cNvSpPr/>
-                  <p:nvPr/>
-                </p:nvSpPr>
-                <p:spPr>
-                  <a:xfrm>
-                    <a:off x="3305032" y="1237397"/>
-                    <a:ext cx="122830" cy="291152"/>
-                  </a:xfrm>
-                  <a:prstGeom prst="ellipse">
-                    <a:avLst/>
-                  </a:prstGeom>
-                  <a:grpFill/>
-                  <a:ln>
-                    <a:solidFill>
-                      <a:schemeClr val="tx1"/>
-                    </a:solidFill>
-                  </a:ln>
-                </p:spPr>
-                <p:style>
-                  <a:lnRef idx="2">
-                    <a:schemeClr val="accent1">
-                      <a:shade val="50000"/>
-                    </a:schemeClr>
-                  </a:lnRef>
-                  <a:fillRef idx="1">
-                    <a:schemeClr val="accent1"/>
-                  </a:fillRef>
-                  <a:effectRef idx="0">
-                    <a:schemeClr val="accent1"/>
-                  </a:effectRef>
-                  <a:fontRef idx="minor">
-                    <a:schemeClr val="lt1"/>
-                  </a:fontRef>
-                </p:style>
-                <p:txBody>
-                  <a:bodyPr rtlCol="0" anchor="ctr"/>
-                  <a:lstStyle/>
-                  <a:p>
-                    <a:pPr algn="ctr"/>
-                    <a:endParaRPr lang="en-NZ"/>
-                  </a:p>
-                </p:txBody>
-              </p:sp>
-              <p:sp>
-                <p:nvSpPr>
-                  <p:cNvPr id="42" name="Oval 41"/>
-                  <p:cNvSpPr/>
-                  <p:nvPr/>
-                </p:nvSpPr>
-                <p:spPr>
-                  <a:xfrm rot="5400000">
-                    <a:off x="3532495" y="1464859"/>
-                    <a:ext cx="122830" cy="291152"/>
-                  </a:xfrm>
-                  <a:prstGeom prst="ellipse">
-                    <a:avLst/>
-                  </a:prstGeom>
-                  <a:grpFill/>
-                  <a:ln>
-                    <a:solidFill>
-                      <a:schemeClr val="tx1"/>
-                    </a:solidFill>
-                  </a:ln>
-                </p:spPr>
-                <p:style>
-                  <a:lnRef idx="2">
-                    <a:schemeClr val="accent1">
-                      <a:shade val="50000"/>
-                    </a:schemeClr>
-                  </a:lnRef>
-                  <a:fillRef idx="1">
-                    <a:schemeClr val="accent1"/>
-                  </a:fillRef>
-                  <a:effectRef idx="0">
-                    <a:schemeClr val="accent1"/>
-                  </a:effectRef>
-                  <a:fontRef idx="minor">
-                    <a:schemeClr val="lt1"/>
-                  </a:fontRef>
-                </p:style>
-                <p:txBody>
-                  <a:bodyPr rtlCol="0" anchor="ctr"/>
-                  <a:lstStyle/>
-                  <a:p>
-                    <a:pPr algn="ctr"/>
-                    <a:endParaRPr lang="en-NZ"/>
-                  </a:p>
-                </p:txBody>
-              </p:sp>
-              <p:sp>
-                <p:nvSpPr>
-                  <p:cNvPr id="43" name="Oval 42"/>
-                  <p:cNvSpPr/>
-                  <p:nvPr/>
-                </p:nvSpPr>
-                <p:spPr>
-                  <a:xfrm>
-                    <a:off x="3305032" y="1692322"/>
-                    <a:ext cx="122830" cy="291152"/>
-                  </a:xfrm>
-                  <a:prstGeom prst="ellipse">
-                    <a:avLst/>
-                  </a:prstGeom>
-                  <a:grpFill/>
-                  <a:ln>
-                    <a:solidFill>
-                      <a:schemeClr val="tx1"/>
-                    </a:solidFill>
-                  </a:ln>
-                </p:spPr>
-                <p:style>
-                  <a:lnRef idx="2">
-                    <a:schemeClr val="accent1">
-                      <a:shade val="50000"/>
-                    </a:schemeClr>
-                  </a:lnRef>
-                  <a:fillRef idx="1">
-                    <a:schemeClr val="accent1"/>
-                  </a:fillRef>
-                  <a:effectRef idx="0">
-                    <a:schemeClr val="accent1"/>
-                  </a:effectRef>
-                  <a:fontRef idx="minor">
-                    <a:schemeClr val="lt1"/>
-                  </a:fontRef>
-                </p:style>
-                <p:txBody>
-                  <a:bodyPr rtlCol="0" anchor="ctr"/>
-                  <a:lstStyle/>
-                  <a:p>
-                    <a:pPr algn="ctr"/>
-                    <a:endParaRPr lang="en-NZ"/>
-                  </a:p>
-                </p:txBody>
-              </p:sp>
-              <p:sp>
-                <p:nvSpPr>
-                  <p:cNvPr id="44" name="Oval 43"/>
-                  <p:cNvSpPr/>
-                  <p:nvPr/>
-                </p:nvSpPr>
-                <p:spPr>
-                  <a:xfrm rot="5400000">
-                    <a:off x="3073020" y="1464859"/>
-                    <a:ext cx="122830" cy="291152"/>
-                  </a:xfrm>
-                  <a:prstGeom prst="ellipse">
-                    <a:avLst/>
-                  </a:prstGeom>
-                  <a:grpFill/>
-                  <a:ln>
-                    <a:solidFill>
-                      <a:schemeClr val="tx1"/>
-                    </a:solidFill>
-                  </a:ln>
-                </p:spPr>
-                <p:style>
-                  <a:lnRef idx="2">
-                    <a:schemeClr val="accent1">
-                      <a:shade val="50000"/>
-                    </a:schemeClr>
-                  </a:lnRef>
-                  <a:fillRef idx="1">
-                    <a:schemeClr val="accent1"/>
-                  </a:fillRef>
-                  <a:effectRef idx="0">
-                    <a:schemeClr val="accent1"/>
-                  </a:effectRef>
-                  <a:fontRef idx="minor">
-                    <a:schemeClr val="lt1"/>
-                  </a:fontRef>
-                </p:style>
-                <p:txBody>
-                  <a:bodyPr rtlCol="0" anchor="ctr"/>
-                  <a:lstStyle/>
-                  <a:p>
-                    <a:pPr algn="ctr"/>
-                    <a:endParaRPr lang="en-NZ"/>
-                  </a:p>
-                </p:txBody>
-              </p:sp>
-            </p:grpSp>
-            <p:grpSp>
-              <p:nvGrpSpPr>
-                <p:cNvPr id="30" name="Group 29"/>
-                <p:cNvGrpSpPr/>
-                <p:nvPr/>
-              </p:nvGrpSpPr>
-              <p:grpSpPr>
-                <a:xfrm rot="1685122">
-                  <a:off x="2991133" y="1241946"/>
-                  <a:ext cx="750627" cy="746077"/>
-                  <a:chOff x="2988859" y="1237397"/>
-                  <a:chExt cx="750627" cy="746077"/>
-                </a:xfrm>
-                <a:pattFill prst="pct25">
-                  <a:fgClr>
-                    <a:schemeClr val="tx1"/>
-                  </a:fgClr>
-                  <a:bgClr>
-                    <a:schemeClr val="bg1"/>
-                  </a:bgClr>
-                </a:pattFill>
-              </p:grpSpPr>
-              <p:sp>
-                <p:nvSpPr>
-                  <p:cNvPr id="37" name="Oval 36"/>
-                  <p:cNvSpPr/>
-                  <p:nvPr/>
-                </p:nvSpPr>
-                <p:spPr>
-                  <a:xfrm>
-                    <a:off x="3305032" y="1237397"/>
-                    <a:ext cx="122830" cy="291152"/>
-                  </a:xfrm>
-                  <a:prstGeom prst="ellipse">
-                    <a:avLst/>
-                  </a:prstGeom>
-                  <a:grpFill/>
-                  <a:ln>
-                    <a:solidFill>
-                      <a:schemeClr val="tx1"/>
-                    </a:solidFill>
-                  </a:ln>
-                </p:spPr>
-                <p:style>
-                  <a:lnRef idx="2">
-                    <a:schemeClr val="accent1">
-                      <a:shade val="50000"/>
-                    </a:schemeClr>
-                  </a:lnRef>
-                  <a:fillRef idx="1">
-                    <a:schemeClr val="accent1"/>
-                  </a:fillRef>
-                  <a:effectRef idx="0">
-                    <a:schemeClr val="accent1"/>
-                  </a:effectRef>
-                  <a:fontRef idx="minor">
-                    <a:schemeClr val="lt1"/>
-                  </a:fontRef>
-                </p:style>
-                <p:txBody>
-                  <a:bodyPr rtlCol="0" anchor="ctr"/>
-                  <a:lstStyle/>
-                  <a:p>
-                    <a:pPr algn="ctr"/>
-                    <a:endParaRPr lang="en-NZ"/>
-                  </a:p>
-                </p:txBody>
-              </p:sp>
-              <p:sp>
-                <p:nvSpPr>
-                  <p:cNvPr id="38" name="Oval 37"/>
-                  <p:cNvSpPr/>
-                  <p:nvPr/>
-                </p:nvSpPr>
-                <p:spPr>
-                  <a:xfrm rot="5400000">
-                    <a:off x="3532495" y="1464859"/>
-                    <a:ext cx="122830" cy="291152"/>
-                  </a:xfrm>
-                  <a:prstGeom prst="ellipse">
-                    <a:avLst/>
-                  </a:prstGeom>
-                  <a:grpFill/>
-                  <a:ln>
-                    <a:solidFill>
-                      <a:schemeClr val="tx1"/>
-                    </a:solidFill>
-                  </a:ln>
-                </p:spPr>
-                <p:style>
-                  <a:lnRef idx="2">
-                    <a:schemeClr val="accent1">
-                      <a:shade val="50000"/>
-                    </a:schemeClr>
-                  </a:lnRef>
-                  <a:fillRef idx="1">
-                    <a:schemeClr val="accent1"/>
-                  </a:fillRef>
-                  <a:effectRef idx="0">
-                    <a:schemeClr val="accent1"/>
-                  </a:effectRef>
-                  <a:fontRef idx="minor">
-                    <a:schemeClr val="lt1"/>
-                  </a:fontRef>
-                </p:style>
-                <p:txBody>
-                  <a:bodyPr rtlCol="0" anchor="ctr"/>
-                  <a:lstStyle/>
-                  <a:p>
-                    <a:pPr algn="ctr"/>
-                    <a:endParaRPr lang="en-NZ"/>
-                  </a:p>
-                </p:txBody>
-              </p:sp>
-              <p:sp>
-                <p:nvSpPr>
-                  <p:cNvPr id="39" name="Oval 38"/>
-                  <p:cNvSpPr/>
-                  <p:nvPr/>
-                </p:nvSpPr>
-                <p:spPr>
-                  <a:xfrm>
-                    <a:off x="3305032" y="1692322"/>
-                    <a:ext cx="122830" cy="291152"/>
-                  </a:xfrm>
-                  <a:prstGeom prst="ellipse">
-                    <a:avLst/>
-                  </a:prstGeom>
-                  <a:grpFill/>
-                  <a:ln>
-                    <a:solidFill>
-                      <a:schemeClr val="tx1"/>
-                    </a:solidFill>
-                  </a:ln>
-                </p:spPr>
-                <p:style>
-                  <a:lnRef idx="2">
-                    <a:schemeClr val="accent1">
-                      <a:shade val="50000"/>
-                    </a:schemeClr>
-                  </a:lnRef>
-                  <a:fillRef idx="1">
-                    <a:schemeClr val="accent1"/>
-                  </a:fillRef>
-                  <a:effectRef idx="0">
-                    <a:schemeClr val="accent1"/>
-                  </a:effectRef>
-                  <a:fontRef idx="minor">
-                    <a:schemeClr val="lt1"/>
-                  </a:fontRef>
-                </p:style>
-                <p:txBody>
-                  <a:bodyPr rtlCol="0" anchor="ctr"/>
-                  <a:lstStyle/>
-                  <a:p>
-                    <a:pPr algn="ctr"/>
-                    <a:endParaRPr lang="en-NZ"/>
-                  </a:p>
-                </p:txBody>
-              </p:sp>
-              <p:sp>
-                <p:nvSpPr>
-                  <p:cNvPr id="40" name="Oval 39"/>
-                  <p:cNvSpPr/>
-                  <p:nvPr/>
-                </p:nvSpPr>
-                <p:spPr>
-                  <a:xfrm rot="5400000">
-                    <a:off x="3073020" y="1464859"/>
-                    <a:ext cx="122830" cy="291152"/>
-                  </a:xfrm>
-                  <a:prstGeom prst="ellipse">
-                    <a:avLst/>
-                  </a:prstGeom>
-                  <a:grpFill/>
-                  <a:ln>
-                    <a:solidFill>
-                      <a:schemeClr val="tx1"/>
-                    </a:solidFill>
-                  </a:ln>
-                </p:spPr>
-                <p:style>
-                  <a:lnRef idx="2">
-                    <a:schemeClr val="accent1">
-                      <a:shade val="50000"/>
-                    </a:schemeClr>
-                  </a:lnRef>
-                  <a:fillRef idx="1">
-                    <a:schemeClr val="accent1"/>
-                  </a:fillRef>
-                  <a:effectRef idx="0">
-                    <a:schemeClr val="accent1"/>
-                  </a:effectRef>
-                  <a:fontRef idx="minor">
-                    <a:schemeClr val="lt1"/>
-                  </a:fontRef>
-                </p:style>
-                <p:txBody>
-                  <a:bodyPr rtlCol="0" anchor="ctr"/>
-                  <a:lstStyle/>
-                  <a:p>
-                    <a:pPr algn="ctr"/>
-                    <a:endParaRPr lang="en-NZ"/>
-                  </a:p>
-                </p:txBody>
-              </p:sp>
-            </p:grpSp>
-            <p:grpSp>
-              <p:nvGrpSpPr>
-                <p:cNvPr id="31" name="Group 30"/>
-                <p:cNvGrpSpPr/>
-                <p:nvPr/>
-              </p:nvGrpSpPr>
-              <p:grpSpPr>
-                <a:xfrm rot="3398779">
-                  <a:off x="2991133" y="1237397"/>
-                  <a:ext cx="750627" cy="746077"/>
-                  <a:chOff x="2988859" y="1237397"/>
-                  <a:chExt cx="750627" cy="746077"/>
-                </a:xfrm>
-                <a:pattFill prst="pct25">
-                  <a:fgClr>
-                    <a:schemeClr val="tx1"/>
-                  </a:fgClr>
-                  <a:bgClr>
-                    <a:schemeClr val="bg1"/>
-                  </a:bgClr>
-                </a:pattFill>
-              </p:grpSpPr>
-              <p:sp>
-                <p:nvSpPr>
-                  <p:cNvPr id="33" name="Oval 32"/>
-                  <p:cNvSpPr/>
-                  <p:nvPr/>
-                </p:nvSpPr>
-                <p:spPr>
-                  <a:xfrm>
-                    <a:off x="3305032" y="1237397"/>
-                    <a:ext cx="122830" cy="291152"/>
-                  </a:xfrm>
-                  <a:prstGeom prst="ellipse">
-                    <a:avLst/>
-                  </a:prstGeom>
-                  <a:grpFill/>
-                  <a:ln>
-                    <a:solidFill>
-                      <a:schemeClr val="tx1"/>
-                    </a:solidFill>
-                  </a:ln>
-                </p:spPr>
-                <p:style>
-                  <a:lnRef idx="2">
-                    <a:schemeClr val="accent1">
-                      <a:shade val="50000"/>
-                    </a:schemeClr>
-                  </a:lnRef>
-                  <a:fillRef idx="1">
-                    <a:schemeClr val="accent1"/>
-                  </a:fillRef>
-                  <a:effectRef idx="0">
-                    <a:schemeClr val="accent1"/>
-                  </a:effectRef>
-                  <a:fontRef idx="minor">
-                    <a:schemeClr val="lt1"/>
-                  </a:fontRef>
-                </p:style>
-                <p:txBody>
-                  <a:bodyPr rtlCol="0" anchor="ctr"/>
-                  <a:lstStyle/>
-                  <a:p>
-                    <a:pPr algn="ctr"/>
-                    <a:endParaRPr lang="en-NZ"/>
-                  </a:p>
-                </p:txBody>
-              </p:sp>
-              <p:sp>
-                <p:nvSpPr>
-                  <p:cNvPr id="34" name="Oval 33"/>
-                  <p:cNvSpPr/>
-                  <p:nvPr/>
-                </p:nvSpPr>
-                <p:spPr>
-                  <a:xfrm rot="5400000">
-                    <a:off x="3532495" y="1464859"/>
-                    <a:ext cx="122830" cy="291152"/>
-                  </a:xfrm>
-                  <a:prstGeom prst="ellipse">
-                    <a:avLst/>
-                  </a:prstGeom>
-                  <a:grpFill/>
-                  <a:ln>
-                    <a:solidFill>
-                      <a:schemeClr val="tx1"/>
-                    </a:solidFill>
-                  </a:ln>
-                </p:spPr>
-                <p:style>
-                  <a:lnRef idx="2">
-                    <a:schemeClr val="accent1">
-                      <a:shade val="50000"/>
-                    </a:schemeClr>
-                  </a:lnRef>
-                  <a:fillRef idx="1">
-                    <a:schemeClr val="accent1"/>
-                  </a:fillRef>
-                  <a:effectRef idx="0">
-                    <a:schemeClr val="accent1"/>
-                  </a:effectRef>
-                  <a:fontRef idx="minor">
-                    <a:schemeClr val="lt1"/>
-                  </a:fontRef>
-                </p:style>
-                <p:txBody>
-                  <a:bodyPr rtlCol="0" anchor="ctr"/>
-                  <a:lstStyle/>
-                  <a:p>
-                    <a:pPr algn="ctr"/>
-                    <a:endParaRPr lang="en-NZ"/>
-                  </a:p>
-                </p:txBody>
-              </p:sp>
-              <p:sp>
-                <p:nvSpPr>
-                  <p:cNvPr id="35" name="Oval 34"/>
-                  <p:cNvSpPr/>
-                  <p:nvPr/>
-                </p:nvSpPr>
-                <p:spPr>
-                  <a:xfrm>
-                    <a:off x="3305032" y="1692322"/>
-                    <a:ext cx="122830" cy="291152"/>
-                  </a:xfrm>
-                  <a:prstGeom prst="ellipse">
-                    <a:avLst/>
-                  </a:prstGeom>
-                  <a:grpFill/>
-                  <a:ln>
-                    <a:solidFill>
-                      <a:schemeClr val="tx1"/>
-                    </a:solidFill>
-                  </a:ln>
-                </p:spPr>
-                <p:style>
-                  <a:lnRef idx="2">
-                    <a:schemeClr val="accent1">
-                      <a:shade val="50000"/>
-                    </a:schemeClr>
-                  </a:lnRef>
-                  <a:fillRef idx="1">
-                    <a:schemeClr val="accent1"/>
-                  </a:fillRef>
-                  <a:effectRef idx="0">
-                    <a:schemeClr val="accent1"/>
-                  </a:effectRef>
-                  <a:fontRef idx="minor">
-                    <a:schemeClr val="lt1"/>
-                  </a:fontRef>
-                </p:style>
-                <p:txBody>
-                  <a:bodyPr rtlCol="0" anchor="ctr"/>
-                  <a:lstStyle/>
-                  <a:p>
-                    <a:pPr algn="ctr"/>
-                    <a:endParaRPr lang="en-NZ"/>
-                  </a:p>
-                </p:txBody>
-              </p:sp>
-              <p:sp>
-                <p:nvSpPr>
-                  <p:cNvPr id="36" name="Oval 35"/>
-                  <p:cNvSpPr/>
-                  <p:nvPr/>
-                </p:nvSpPr>
-                <p:spPr>
-                  <a:xfrm rot="5400000">
-                    <a:off x="3073020" y="1464859"/>
-                    <a:ext cx="122830" cy="291152"/>
-                  </a:xfrm>
-                  <a:prstGeom prst="ellipse">
-                    <a:avLst/>
-                  </a:prstGeom>
-                  <a:grpFill/>
-                  <a:ln>
-                    <a:solidFill>
-                      <a:schemeClr val="tx1"/>
-                    </a:solidFill>
-                  </a:ln>
-                </p:spPr>
-                <p:style>
-                  <a:lnRef idx="2">
-                    <a:schemeClr val="accent1">
-                      <a:shade val="50000"/>
-                    </a:schemeClr>
-                  </a:lnRef>
-                  <a:fillRef idx="1">
-                    <a:schemeClr val="accent1"/>
-                  </a:fillRef>
-                  <a:effectRef idx="0">
-                    <a:schemeClr val="accent1"/>
-                  </a:effectRef>
-                  <a:fontRef idx="minor">
-                    <a:schemeClr val="lt1"/>
-                  </a:fontRef>
-                </p:style>
-                <p:txBody>
-                  <a:bodyPr rtlCol="0" anchor="ctr"/>
-                  <a:lstStyle/>
-                  <a:p>
-                    <a:pPr algn="ctr"/>
-                    <a:endParaRPr lang="en-NZ"/>
-                  </a:p>
-                </p:txBody>
-              </p:sp>
-            </p:grpSp>
-            <p:sp>
-              <p:nvSpPr>
-                <p:cNvPr id="32" name="Oval 31"/>
-                <p:cNvSpPr/>
-                <p:nvPr/>
-              </p:nvSpPr>
-              <p:spPr>
-                <a:xfrm>
-                  <a:off x="3284561" y="1528549"/>
-                  <a:ext cx="163773" cy="163773"/>
-                </a:xfrm>
-                <a:prstGeom prst="ellipse">
-                  <a:avLst/>
-                </a:prstGeom>
-                <a:solidFill>
-                  <a:schemeClr val="bg1"/>
-                </a:solidFill>
-                <a:ln>
-                  <a:solidFill>
-                    <a:schemeClr val="tx1"/>
-                  </a:solidFill>
-                </a:ln>
-              </p:spPr>
-              <p:style>
-                <a:lnRef idx="2">
-                  <a:schemeClr val="accent1">
-                    <a:shade val="50000"/>
-                  </a:schemeClr>
-                </a:lnRef>
-                <a:fillRef idx="1">
-                  <a:schemeClr val="accent1"/>
-                </a:fillRef>
-                <a:effectRef idx="0">
-                  <a:schemeClr val="accent1"/>
-                </a:effectRef>
-                <a:fontRef idx="minor">
-                  <a:schemeClr val="lt1"/>
-                </a:fontRef>
-              </p:style>
-              <p:txBody>
-                <a:bodyPr rtlCol="0" anchor="ctr"/>
-                <a:lstStyle/>
-                <a:p>
-                  <a:pPr algn="ctr"/>
-                  <a:endParaRPr lang="en-NZ"/>
-                </a:p>
-              </p:txBody>
-            </p:sp>
-          </p:grpSp>
-          <p:cxnSp>
-            <p:nvCxnSpPr>
-              <p:cNvPr id="23" name="Straight Connector 22"/>
-              <p:cNvCxnSpPr>
-                <a:stCxn id="21" idx="7"/>
-                <a:endCxn id="21" idx="2"/>
-              </p:cNvCxnSpPr>
-              <p:nvPr/>
-            </p:nvCxnSpPr>
-            <p:spPr>
-              <a:xfrm>
-                <a:off x="1251620" y="2088535"/>
-                <a:ext cx="944236" cy="0"/>
-              </a:xfrm>
-              <a:prstGeom prst="line">
-                <a:avLst/>
-              </a:prstGeom>
-              <a:ln>
-                <a:solidFill>
-                  <a:schemeClr val="tx1"/>
-                </a:solidFill>
-              </a:ln>
-            </p:spPr>
-            <p:style>
-              <a:lnRef idx="1">
-                <a:schemeClr val="accent1"/>
-              </a:lnRef>
-              <a:fillRef idx="0">
-                <a:schemeClr val="accent1"/>
-              </a:fillRef>
-              <a:effectRef idx="0">
-                <a:schemeClr val="accent1"/>
-              </a:effectRef>
-              <a:fontRef idx="minor">
-                <a:schemeClr val="tx1"/>
-              </a:fontRef>
-            </p:style>
-          </p:cxnSp>
-          <p:sp>
-            <p:nvSpPr>
-              <p:cNvPr id="24" name="Rounded Rectangle 23"/>
-              <p:cNvSpPr/>
-              <p:nvPr/>
-            </p:nvSpPr>
-            <p:spPr>
-              <a:xfrm>
-                <a:off x="2332192" y="2212867"/>
-                <a:ext cx="222913" cy="359391"/>
-              </a:xfrm>
-              <a:prstGeom prst="roundRect">
-                <a:avLst/>
-              </a:prstGeom>
-              <a:pattFill prst="dashHorz">
-                <a:fgClr>
-                  <a:schemeClr val="tx1"/>
-                </a:fgClr>
-                <a:bgClr>
-                  <a:schemeClr val="bg1"/>
-                </a:bgClr>
-              </a:pattFill>
-              <a:ln>
-                <a:solidFill>
-                  <a:schemeClr val="tx1"/>
-                </a:solidFill>
-              </a:ln>
-            </p:spPr>
-            <p:style>
-              <a:lnRef idx="2">
-                <a:schemeClr val="accent1">
-                  <a:shade val="50000"/>
-                </a:schemeClr>
-              </a:lnRef>
-              <a:fillRef idx="1">
-                <a:schemeClr val="accent1"/>
-              </a:fillRef>
-              <a:effectRef idx="0">
-                <a:schemeClr val="accent1"/>
-              </a:effectRef>
-              <a:fontRef idx="minor">
-                <a:schemeClr val="lt1"/>
-              </a:fontRef>
-            </p:style>
-            <p:txBody>
-              <a:bodyPr rtlCol="0" anchor="ctr"/>
-              <a:lstStyle/>
-              <a:p>
-                <a:pPr algn="ctr"/>
-                <a:endParaRPr lang="en-NZ"/>
-              </a:p>
-            </p:txBody>
-          </p:sp>
-          <p:grpSp>
-            <p:nvGrpSpPr>
-              <p:cNvPr id="25" name="Group 24"/>
-              <p:cNvGrpSpPr/>
-              <p:nvPr/>
-            </p:nvGrpSpPr>
-            <p:grpSpPr>
-              <a:xfrm>
-                <a:off x="2334499" y="2077963"/>
-                <a:ext cx="360000" cy="360000"/>
-                <a:chOff x="2425484" y="2037022"/>
-                <a:chExt cx="360000" cy="360000"/>
-              </a:xfrm>
-            </p:grpSpPr>
-            <p:sp>
-              <p:nvSpPr>
-                <p:cNvPr id="26" name="Arc 25"/>
-                <p:cNvSpPr/>
-                <p:nvPr/>
-              </p:nvSpPr>
-              <p:spPr>
-                <a:xfrm>
-                  <a:off x="2497484" y="2109022"/>
-                  <a:ext cx="216000" cy="216000"/>
-                </a:xfrm>
-                <a:prstGeom prst="arc">
-                  <a:avLst/>
-                </a:prstGeom>
-                <a:ln w="9525" cap="rnd">
-                  <a:solidFill>
-                    <a:schemeClr val="tx1"/>
-                  </a:solidFill>
-                </a:ln>
-              </p:spPr>
-              <p:style>
-                <a:lnRef idx="1">
-                  <a:schemeClr val="accent1"/>
-                </a:lnRef>
-                <a:fillRef idx="0">
-                  <a:schemeClr val="accent1"/>
-                </a:fillRef>
-                <a:effectRef idx="0">
-                  <a:schemeClr val="accent1"/>
-                </a:effectRef>
-                <a:fontRef idx="minor">
-                  <a:schemeClr val="tx1"/>
-                </a:fontRef>
-              </p:style>
-              <p:txBody>
-                <a:bodyPr rtlCol="0" anchor="ctr"/>
-                <a:lstStyle/>
-                <a:p>
-                  <a:pPr algn="ctr"/>
-                  <a:endParaRPr lang="en-NZ"/>
-                </a:p>
-              </p:txBody>
-            </p:sp>
-            <p:sp>
-              <p:nvSpPr>
-                <p:cNvPr id="27" name="Arc 26"/>
-                <p:cNvSpPr/>
-                <p:nvPr/>
-              </p:nvSpPr>
-              <p:spPr>
-                <a:xfrm>
-                  <a:off x="2425484" y="2037022"/>
-                  <a:ext cx="360000" cy="360000"/>
-                </a:xfrm>
-                <a:prstGeom prst="arc">
-                  <a:avLst/>
-                </a:prstGeom>
-                <a:ln w="9525" cap="rnd">
-                  <a:solidFill>
-                    <a:schemeClr val="tx1"/>
-                  </a:solidFill>
-                </a:ln>
-              </p:spPr>
-              <p:style>
-                <a:lnRef idx="1">
-                  <a:schemeClr val="accent1"/>
-                </a:lnRef>
-                <a:fillRef idx="0">
-                  <a:schemeClr val="accent1"/>
-                </a:fillRef>
-                <a:effectRef idx="0">
-                  <a:schemeClr val="accent1"/>
-                </a:effectRef>
-                <a:fontRef idx="minor">
-                  <a:schemeClr val="tx1"/>
-                </a:fontRef>
-              </p:style>
-              <p:txBody>
-                <a:bodyPr rtlCol="0" anchor="ctr"/>
-                <a:lstStyle/>
-                <a:p>
-                  <a:pPr algn="ctr"/>
-                  <a:endParaRPr lang="en-NZ"/>
-                </a:p>
-              </p:txBody>
-            </p:sp>
-            <p:sp>
-              <p:nvSpPr>
-                <p:cNvPr id="28" name="Arc 27"/>
-                <p:cNvSpPr/>
-                <p:nvPr/>
-              </p:nvSpPr>
-              <p:spPr>
-                <a:xfrm>
-                  <a:off x="2461484" y="2073022"/>
-                  <a:ext cx="288000" cy="288000"/>
-                </a:xfrm>
-                <a:prstGeom prst="arc">
-                  <a:avLst/>
-                </a:prstGeom>
-                <a:ln w="9525" cap="rnd">
-                  <a:solidFill>
-                    <a:schemeClr val="tx1"/>
-                  </a:solidFill>
-                </a:ln>
-              </p:spPr>
-              <p:style>
-                <a:lnRef idx="1">
-                  <a:schemeClr val="accent1"/>
-                </a:lnRef>
-                <a:fillRef idx="0">
-                  <a:schemeClr val="accent1"/>
-                </a:fillRef>
-                <a:effectRef idx="0">
-                  <a:schemeClr val="accent1"/>
-                </a:effectRef>
-                <a:fontRef idx="minor">
-                  <a:schemeClr val="tx1"/>
-                </a:fontRef>
-              </p:style>
-              <p:txBody>
-                <a:bodyPr rtlCol="0" anchor="ctr"/>
-                <a:lstStyle/>
-                <a:p>
-                  <a:pPr algn="ctr"/>
-                  <a:endParaRPr lang="en-NZ"/>
-                </a:p>
-              </p:txBody>
-            </p:sp>
-          </p:grpSp>
-        </p:grpSp>
-        <p:sp>
-          <p:nvSpPr>
-            <p:cNvPr id="3" name="TextBox 2"/>
-            <p:cNvSpPr txBox="1"/>
-            <p:nvPr/>
-          </p:nvSpPr>
-          <p:spPr>
-            <a:xfrm>
-              <a:off x="463769" y="2961998"/>
-              <a:ext cx="2039441" cy="338554"/>
-            </a:xfrm>
-            <a:prstGeom prst="rect">
-              <a:avLst/>
-            </a:prstGeom>
-            <a:noFill/>
-          </p:spPr>
-          <p:txBody>
-            <a:bodyPr wrap="square" rtlCol="0">
-              <a:spAutoFit/>
-            </a:bodyPr>
-            <a:lstStyle/>
-            <a:p>
-              <a:pPr algn="ctr"/>
-              <a:r>
-                <a:rPr lang="en-NZ" sz="1600" dirty="0" smtClean="0">
-                  <a:latin typeface="Juice ITC" panose="04040403040A02020202" pitchFamily="82" charset="0"/>
-                </a:rPr>
-                <a:t>Plant Monitoring System</a:t>
-              </a:r>
-              <a:endParaRPr lang="en-NZ" sz="1600" dirty="0">
-                <a:latin typeface="Juice ITC" panose="04040403040A02020202" pitchFamily="82" charset="0"/>
-              </a:endParaRPr>
-            </a:p>
-          </p:txBody>
-        </p:sp>
-      </p:grpSp>
       <p:sp>
         <p:nvSpPr>
           <p:cNvPr id="45" name="Rectangle 44"/>
@@ -6156,10 +5794,39 @@
           </a:p>
         </p:txBody>
       </p:sp>
+      <p:sp>
+        <p:nvSpPr>
+          <p:cNvPr id="51" name="TextBox 50"/>
+          <p:cNvSpPr txBox="1"/>
+          <p:nvPr/>
+        </p:nvSpPr>
+        <p:spPr>
+          <a:xfrm>
+            <a:off x="5247518" y="3777562"/>
+            <a:ext cx="1390921" cy="338554"/>
+          </a:xfrm>
+          <a:prstGeom prst="rect">
+            <a:avLst/>
+          </a:prstGeom>
+          <a:noFill/>
+        </p:spPr>
+        <p:txBody>
+          <a:bodyPr wrap="square" rtlCol="0">
+            <a:spAutoFit/>
+          </a:bodyPr>
+          <a:lstStyle/>
+          <a:p>
+            <a:pPr algn="ctr"/>
+            <a:endParaRPr lang="en-NZ" sz="1600" dirty="0">
+              <a:latin typeface="Juice ITC" panose="04040403040A02020202" pitchFamily="82" charset="0"/>
+            </a:endParaRPr>
+          </a:p>
+        </p:txBody>
+      </p:sp>
     </p:spTree>
     <p:extLst>
       <p:ext uri="{BB962C8B-B14F-4D97-AF65-F5344CB8AC3E}">
-        <p14:creationId xmlns:p14="http://schemas.microsoft.com/office/powerpoint/2010/main" val="798642477"/>
+        <p14:creationId xmlns:p14="http://schemas.microsoft.com/office/powerpoint/2010/main" val="322973711"/>
       </p:ext>
     </p:extLst>
   </p:cSld>
@@ -6169,7 +5836,7 @@
 </p:sld>
 </file>
 
-<file path=ppt/slides/slide3.xml><?xml version="1.0" encoding="utf-8"?>
+<file path=ppt/slides/slide5.xml><?xml version="1.0" encoding="utf-8"?>
 <p:sld xmlns:a="http://schemas.openxmlformats.org/drawingml/2006/main" xmlns:r="http://schemas.openxmlformats.org/officeDocument/2006/relationships" xmlns:p="http://schemas.openxmlformats.org/presentationml/2006/main">
   <p:cSld>
     <p:spTree>

</xml_diff>